<commit_message>
Resize powerpoint k8s update animation
</commit_message>
<xml_diff>
--- a/deployment/images/Kubernetes.pptx
+++ b/deployment/images/Kubernetes.pptx
@@ -104,6 +104,11 @@
       </a:defRPr>
     </a:lvl9pPr>
   </p:defaultTextStyle>
+  <p:extLst>
+    <p:ext uri="{EFAFB233-063F-42B5-8137-9DF3F51BA10A}">
+      <p15:sldGuideLst xmlns:p15="http://schemas.microsoft.com/office/powerpoint/2012/main"/>
+    </p:ext>
+  </p:extLst>
 </p:presentation>
 </file>
 
@@ -254,7 +259,7 @@
           <a:p>
             <a:fld id="{D9182989-1BFC-4684-AAF0-16D171E0F273}" type="datetimeFigureOut">
               <a:rPr lang="en-US" smtClean="0"/>
-              <a:t>10/30/2021</a:t>
+              <a:t>11/12/2021</a:t>
             </a:fld>
             <a:endParaRPr lang="en-US"/>
           </a:p>
@@ -452,7 +457,7 @@
           <a:p>
             <a:fld id="{D9182989-1BFC-4684-AAF0-16D171E0F273}" type="datetimeFigureOut">
               <a:rPr lang="en-US" smtClean="0"/>
-              <a:t>10/30/2021</a:t>
+              <a:t>11/12/2021</a:t>
             </a:fld>
             <a:endParaRPr lang="en-US"/>
           </a:p>
@@ -660,7 +665,7 @@
           <a:p>
             <a:fld id="{D9182989-1BFC-4684-AAF0-16D171E0F273}" type="datetimeFigureOut">
               <a:rPr lang="en-US" smtClean="0"/>
-              <a:t>10/30/2021</a:t>
+              <a:t>11/12/2021</a:t>
             </a:fld>
             <a:endParaRPr lang="en-US"/>
           </a:p>
@@ -858,7 +863,7 @@
           <a:p>
             <a:fld id="{D9182989-1BFC-4684-AAF0-16D171E0F273}" type="datetimeFigureOut">
               <a:rPr lang="en-US" smtClean="0"/>
-              <a:t>10/30/2021</a:t>
+              <a:t>11/12/2021</a:t>
             </a:fld>
             <a:endParaRPr lang="en-US"/>
           </a:p>
@@ -1133,7 +1138,7 @@
           <a:p>
             <a:fld id="{D9182989-1BFC-4684-AAF0-16D171E0F273}" type="datetimeFigureOut">
               <a:rPr lang="en-US" smtClean="0"/>
-              <a:t>10/30/2021</a:t>
+              <a:t>11/12/2021</a:t>
             </a:fld>
             <a:endParaRPr lang="en-US"/>
           </a:p>
@@ -1398,7 +1403,7 @@
           <a:p>
             <a:fld id="{D9182989-1BFC-4684-AAF0-16D171E0F273}" type="datetimeFigureOut">
               <a:rPr lang="en-US" smtClean="0"/>
-              <a:t>10/30/2021</a:t>
+              <a:t>11/12/2021</a:t>
             </a:fld>
             <a:endParaRPr lang="en-US"/>
           </a:p>
@@ -1810,7 +1815,7 @@
           <a:p>
             <a:fld id="{D9182989-1BFC-4684-AAF0-16D171E0F273}" type="datetimeFigureOut">
               <a:rPr lang="en-US" smtClean="0"/>
-              <a:t>10/30/2021</a:t>
+              <a:t>11/12/2021</a:t>
             </a:fld>
             <a:endParaRPr lang="en-US"/>
           </a:p>
@@ -1951,7 +1956,7 @@
           <a:p>
             <a:fld id="{D9182989-1BFC-4684-AAF0-16D171E0F273}" type="datetimeFigureOut">
               <a:rPr lang="en-US" smtClean="0"/>
-              <a:t>10/30/2021</a:t>
+              <a:t>11/12/2021</a:t>
             </a:fld>
             <a:endParaRPr lang="en-US"/>
           </a:p>
@@ -2064,7 +2069,7 @@
           <a:p>
             <a:fld id="{D9182989-1BFC-4684-AAF0-16D171E0F273}" type="datetimeFigureOut">
               <a:rPr lang="en-US" smtClean="0"/>
-              <a:t>10/30/2021</a:t>
+              <a:t>11/12/2021</a:t>
             </a:fld>
             <a:endParaRPr lang="en-US"/>
           </a:p>
@@ -2375,7 +2380,7 @@
           <a:p>
             <a:fld id="{D9182989-1BFC-4684-AAF0-16D171E0F273}" type="datetimeFigureOut">
               <a:rPr lang="en-US" smtClean="0"/>
-              <a:t>10/30/2021</a:t>
+              <a:t>11/12/2021</a:t>
             </a:fld>
             <a:endParaRPr lang="en-US"/>
           </a:p>
@@ -2663,7 +2668,7 @@
           <a:p>
             <a:fld id="{D9182989-1BFC-4684-AAF0-16D171E0F273}" type="datetimeFigureOut">
               <a:rPr lang="en-US" smtClean="0"/>
-              <a:t>10/30/2021</a:t>
+              <a:t>11/12/2021</a:t>
             </a:fld>
             <a:endParaRPr lang="en-US"/>
           </a:p>
@@ -2904,7 +2909,7 @@
           <a:p>
             <a:fld id="{D9182989-1BFC-4684-AAF0-16D171E0F273}" type="datetimeFigureOut">
               <a:rPr lang="en-US" smtClean="0"/>
-              <a:t>10/30/2021</a:t>
+              <a:t>11/12/2021</a:t>
             </a:fld>
             <a:endParaRPr lang="en-US"/>
           </a:p>
@@ -3335,8 +3340,8 @@
         </p:nvSpPr>
         <p:spPr>
           <a:xfrm>
-            <a:off x="2102300" y="3347519"/>
-            <a:ext cx="1924594" cy="1497874"/>
+            <a:off x="3669843" y="3347518"/>
+            <a:ext cx="2216914" cy="1892765"/>
           </a:xfrm>
           <a:prstGeom prst="rect">
             <a:avLst/>
@@ -3387,8 +3392,8 @@
         </p:nvSpPr>
         <p:spPr>
           <a:xfrm>
-            <a:off x="2102300" y="2833713"/>
-            <a:ext cx="1924594" cy="513806"/>
+            <a:off x="3669843" y="2833712"/>
+            <a:ext cx="2216914" cy="649263"/>
           </a:xfrm>
           <a:prstGeom prst="rect">
             <a:avLst/>
@@ -3446,8 +3451,8 @@
         </p:nvSpPr>
         <p:spPr>
           <a:xfrm>
-            <a:off x="2204736" y="4026787"/>
-            <a:ext cx="809898" cy="513806"/>
+            <a:off x="3870247" y="4026786"/>
+            <a:ext cx="932911" cy="649263"/>
           </a:xfrm>
           <a:prstGeom prst="rect">
             <a:avLst/>
@@ -3503,8 +3508,8 @@
         </p:nvSpPr>
         <p:spPr>
           <a:xfrm>
-            <a:off x="3705496" y="944878"/>
-            <a:ext cx="966651" cy="557349"/>
+            <a:off x="5235618" y="931239"/>
+            <a:ext cx="1113473" cy="704285"/>
           </a:xfrm>
           <a:prstGeom prst="roundRect">
             <a:avLst/>
@@ -3569,8 +3574,8 @@
         </p:blipFill>
         <p:spPr>
           <a:xfrm>
-            <a:off x="2662049" y="4095367"/>
-            <a:ext cx="368050" cy="376645"/>
+            <a:off x="4327560" y="4095367"/>
+            <a:ext cx="466727" cy="477626"/>
           </a:xfrm>
           <a:prstGeom prst="rect">
             <a:avLst/>
@@ -3591,8 +3596,8 @@
         </p:nvSpPr>
         <p:spPr>
           <a:xfrm>
-            <a:off x="3088656" y="4026787"/>
-            <a:ext cx="809898" cy="513806"/>
+            <a:off x="4754167" y="4026786"/>
+            <a:ext cx="932911" cy="649263"/>
           </a:xfrm>
           <a:prstGeom prst="rect">
             <a:avLst/>
@@ -3670,8 +3675,8 @@
         </p:blipFill>
         <p:spPr>
           <a:xfrm>
-            <a:off x="3553152" y="4108970"/>
-            <a:ext cx="376645" cy="376645"/>
+            <a:off x="5218664" y="4108970"/>
+            <a:ext cx="477627" cy="477627"/>
           </a:xfrm>
           <a:prstGeom prst="rect">
             <a:avLst/>
@@ -3692,8 +3697,8 @@
         </p:nvSpPr>
         <p:spPr>
           <a:xfrm>
-            <a:off x="1004935" y="2704009"/>
-            <a:ext cx="6427960" cy="2447413"/>
+            <a:off x="2267995" y="2628345"/>
+            <a:ext cx="7404280" cy="3092634"/>
           </a:xfrm>
           <a:prstGeom prst="rect">
             <a:avLst/>
@@ -3738,14 +3743,16 @@
             </a:extLst>
           </p:cNvPr>
           <p:cNvCxnSpPr>
+            <a:cxnSpLocks/>
             <a:stCxn id="11" idx="2"/>
+            <a:endCxn id="9" idx="0"/>
           </p:cNvCxnSpPr>
           <p:nvPr/>
         </p:nvCxnSpPr>
         <p:spPr>
           <a:xfrm>
-            <a:off x="4188822" y="1502227"/>
-            <a:ext cx="2932" cy="942209"/>
+            <a:off x="5792355" y="1635524"/>
+            <a:ext cx="0" cy="236817"/>
           </a:xfrm>
           <a:prstGeom prst="line">
             <a:avLst/>
@@ -3782,8 +3789,8 @@
         </p:nvCxnSpPr>
         <p:spPr>
           <a:xfrm>
-            <a:off x="3064597" y="2444436"/>
-            <a:ext cx="2405853" cy="0"/>
+            <a:off x="4215763" y="2444436"/>
+            <a:ext cx="2771269" cy="0"/>
           </a:xfrm>
           <a:prstGeom prst="line">
             <a:avLst/>
@@ -3821,8 +3828,8 @@
         </p:nvCxnSpPr>
         <p:spPr>
           <a:xfrm>
-            <a:off x="3064597" y="2444436"/>
-            <a:ext cx="0" cy="389277"/>
+            <a:off x="4778300" y="2455577"/>
+            <a:ext cx="0" cy="378135"/>
           </a:xfrm>
           <a:prstGeom prst="straightConnector1">
             <a:avLst/>
@@ -3857,13 +3864,14 @@
           </p:cNvPr>
           <p:cNvCxnSpPr>
             <a:cxnSpLocks/>
+            <a:endCxn id="62" idx="0"/>
           </p:cNvCxnSpPr>
           <p:nvPr/>
         </p:nvCxnSpPr>
         <p:spPr>
           <a:xfrm>
-            <a:off x="5470450" y="2444436"/>
-            <a:ext cx="0" cy="389277"/>
+            <a:off x="7163924" y="2467706"/>
+            <a:ext cx="0" cy="379609"/>
           </a:xfrm>
           <a:prstGeom prst="straightConnector1">
             <a:avLst/>
@@ -3901,8 +3909,8 @@
         </p:nvSpPr>
         <p:spPr>
           <a:xfrm>
-            <a:off x="1210489" y="1872341"/>
-            <a:ext cx="5956663" cy="461555"/>
+            <a:off x="2361655" y="1872341"/>
+            <a:ext cx="6861400" cy="583236"/>
           </a:xfrm>
           <a:prstGeom prst="roundRect">
             <a:avLst/>
@@ -3953,8 +3961,8 @@
         </p:nvCxnSpPr>
         <p:spPr>
           <a:xfrm>
-            <a:off x="3064597" y="3347519"/>
-            <a:ext cx="0" cy="386680"/>
+            <a:off x="4778300" y="3482975"/>
+            <a:ext cx="0" cy="248432"/>
           </a:xfrm>
           <a:prstGeom prst="line">
             <a:avLst/>
@@ -3991,8 +3999,8 @@
         </p:nvCxnSpPr>
         <p:spPr>
           <a:xfrm>
-            <a:off x="2609685" y="3734199"/>
-            <a:ext cx="883920" cy="0"/>
+            <a:off x="4327560" y="3731077"/>
+            <a:ext cx="1018175" cy="0"/>
           </a:xfrm>
           <a:prstGeom prst="line">
             <a:avLst/>
@@ -4024,14 +4032,13 @@
           </p:cNvPr>
           <p:cNvCxnSpPr>
             <a:cxnSpLocks/>
-            <a:endCxn id="7" idx="0"/>
           </p:cNvCxnSpPr>
           <p:nvPr/>
         </p:nvCxnSpPr>
         <p:spPr>
-          <a:xfrm>
-            <a:off x="2609685" y="3734199"/>
-            <a:ext cx="0" cy="292588"/>
+          <a:xfrm flipH="1">
+            <a:off x="4336701" y="3742363"/>
+            <a:ext cx="1" cy="258112"/>
           </a:xfrm>
           <a:prstGeom prst="straightConnector1">
             <a:avLst/>
@@ -4066,14 +4073,13 @@
           </p:cNvPr>
           <p:cNvCxnSpPr>
             <a:cxnSpLocks/>
-            <a:endCxn id="21" idx="0"/>
           </p:cNvCxnSpPr>
           <p:nvPr/>
         </p:nvCxnSpPr>
         <p:spPr>
           <a:xfrm>
-            <a:off x="3493605" y="3734199"/>
-            <a:ext cx="0" cy="292588"/>
+            <a:off x="5345735" y="3723486"/>
+            <a:ext cx="0" cy="276989"/>
           </a:xfrm>
           <a:prstGeom prst="straightConnector1">
             <a:avLst/>
@@ -4111,8 +4117,8 @@
         </p:nvSpPr>
         <p:spPr>
           <a:xfrm>
-            <a:off x="4487924" y="3361122"/>
-            <a:ext cx="1924594" cy="1497874"/>
+            <a:off x="6055467" y="3361121"/>
+            <a:ext cx="2216914" cy="1892765"/>
           </a:xfrm>
           <a:prstGeom prst="rect">
             <a:avLst/>
@@ -4163,8 +4169,8 @@
         </p:nvSpPr>
         <p:spPr>
           <a:xfrm>
-            <a:off x="4487924" y="2847316"/>
-            <a:ext cx="1924594" cy="513806"/>
+            <a:off x="6055467" y="2847315"/>
+            <a:ext cx="2216914" cy="649263"/>
           </a:xfrm>
           <a:prstGeom prst="rect">
             <a:avLst/>
@@ -4224,9 +4230,9 @@
           <p:nvPr/>
         </p:nvCxnSpPr>
         <p:spPr>
-          <a:xfrm>
-            <a:off x="5450221" y="3361122"/>
-            <a:ext cx="0" cy="386680"/>
+          <a:xfrm flipH="1">
+            <a:off x="7163923" y="3496578"/>
+            <a:ext cx="1" cy="251221"/>
           </a:xfrm>
           <a:prstGeom prst="line">
             <a:avLst/>
@@ -4247,107 +4253,85 @@
           </a:fontRef>
         </p:style>
       </p:cxnSp>
-      <p:grpSp>
-        <p:nvGrpSpPr>
-          <p:cNvPr id="99" name="Group 98">
-            <a:extLst>
-              <a:ext uri="{FF2B5EF4-FFF2-40B4-BE49-F238E27FC236}">
-                <a16:creationId xmlns:a16="http://schemas.microsoft.com/office/drawing/2014/main" id="{51F5A156-3290-47E9-91FC-AC17A6A58FE0}"/>
-              </a:ext>
-            </a:extLst>
-          </p:cNvPr>
-          <p:cNvGrpSpPr/>
+      <p:cxnSp>
+        <p:nvCxnSpPr>
+          <p:cNvPr id="68" name="Straight Connector 67">
+            <a:extLst>
+              <a:ext uri="{FF2B5EF4-FFF2-40B4-BE49-F238E27FC236}">
+                <a16:creationId xmlns:a16="http://schemas.microsoft.com/office/drawing/2014/main" id="{1B452C5C-1B87-472A-A917-78F978D916EE}"/>
+              </a:ext>
+            </a:extLst>
+          </p:cNvPr>
+          <p:cNvCxnSpPr>
+            <a:cxnSpLocks/>
+          </p:cNvCxnSpPr>
           <p:nvPr/>
-        </p:nvGrpSpPr>
-        <p:grpSpPr>
+        </p:nvCxnSpPr>
+        <p:spPr>
+          <a:xfrm flipV="1">
+            <a:off x="6562859" y="3747800"/>
+            <a:ext cx="607816" cy="1"/>
+          </a:xfrm>
+          <a:prstGeom prst="line">
+            <a:avLst/>
+          </a:prstGeom>
+        </p:spPr>
+        <p:style>
+          <a:lnRef idx="1">
+            <a:schemeClr val="accent1"/>
+          </a:lnRef>
+          <a:fillRef idx="0">
+            <a:schemeClr val="accent1"/>
+          </a:fillRef>
+          <a:effectRef idx="0">
+            <a:schemeClr val="accent1"/>
+          </a:effectRef>
+          <a:fontRef idx="minor">
+            <a:schemeClr val="tx1"/>
+          </a:fontRef>
+        </p:style>
+      </p:cxnSp>
+      <p:cxnSp>
+        <p:nvCxnSpPr>
+          <p:cNvPr id="69" name="Straight Arrow Connector 68">
+            <a:extLst>
+              <a:ext uri="{FF2B5EF4-FFF2-40B4-BE49-F238E27FC236}">
+                <a16:creationId xmlns:a16="http://schemas.microsoft.com/office/drawing/2014/main" id="{834E11D3-6F3F-4C3C-8BD2-05D4AE33ED78}"/>
+              </a:ext>
+            </a:extLst>
+          </p:cNvPr>
+          <p:cNvCxnSpPr>
+            <a:cxnSpLocks/>
+          </p:cNvCxnSpPr>
+          <p:nvPr/>
+        </p:nvCxnSpPr>
+        <p:spPr>
           <a:xfrm>
-            <a:off x="4995309" y="3747802"/>
-            <a:ext cx="454912" cy="292588"/>
-            <a:chOff x="4995309" y="3747802"/>
-            <a:chExt cx="454912" cy="292588"/>
+            <a:off x="6562858" y="3747803"/>
+            <a:ext cx="0" cy="262581"/>
           </a:xfrm>
-        </p:grpSpPr>
-        <p:cxnSp>
-          <p:nvCxnSpPr>
-            <p:cNvPr id="68" name="Straight Connector 67">
-              <a:extLst>
-                <a:ext uri="{FF2B5EF4-FFF2-40B4-BE49-F238E27FC236}">
-                  <a16:creationId xmlns:a16="http://schemas.microsoft.com/office/drawing/2014/main" id="{1B452C5C-1B87-472A-A917-78F978D916EE}"/>
-                </a:ext>
-              </a:extLst>
-            </p:cNvPr>
-            <p:cNvCxnSpPr>
-              <a:cxnSpLocks/>
-            </p:cNvCxnSpPr>
-            <p:nvPr/>
-          </p:nvCxnSpPr>
-          <p:spPr>
-            <a:xfrm flipV="1">
-              <a:off x="4995309" y="3747802"/>
-              <a:ext cx="454912" cy="1"/>
-            </a:xfrm>
-            <a:prstGeom prst="line">
-              <a:avLst/>
-            </a:prstGeom>
-          </p:spPr>
-          <p:style>
-            <a:lnRef idx="1">
-              <a:schemeClr val="accent1"/>
-            </a:lnRef>
-            <a:fillRef idx="0">
-              <a:schemeClr val="accent1"/>
-            </a:fillRef>
-            <a:effectRef idx="0">
-              <a:schemeClr val="accent1"/>
-            </a:effectRef>
-            <a:fontRef idx="minor">
-              <a:schemeClr val="tx1"/>
-            </a:fontRef>
-          </p:style>
-        </p:cxnSp>
-        <p:cxnSp>
-          <p:nvCxnSpPr>
-            <p:cNvPr id="69" name="Straight Arrow Connector 68">
-              <a:extLst>
-                <a:ext uri="{FF2B5EF4-FFF2-40B4-BE49-F238E27FC236}">
-                  <a16:creationId xmlns:a16="http://schemas.microsoft.com/office/drawing/2014/main" id="{834E11D3-6F3F-4C3C-8BD2-05D4AE33ED78}"/>
-                </a:ext>
-              </a:extLst>
-            </p:cNvPr>
-            <p:cNvCxnSpPr>
-              <a:cxnSpLocks/>
-              <a:endCxn id="63" idx="0"/>
-            </p:cNvCxnSpPr>
-            <p:nvPr/>
-          </p:nvCxnSpPr>
-          <p:spPr>
-            <a:xfrm>
-              <a:off x="4995309" y="3747802"/>
-              <a:ext cx="0" cy="292588"/>
-            </a:xfrm>
-            <a:prstGeom prst="straightConnector1">
-              <a:avLst/>
-            </a:prstGeom>
-            <a:ln>
-              <a:tailEnd type="triangle"/>
-            </a:ln>
-          </p:spPr>
-          <p:style>
-            <a:lnRef idx="1">
-              <a:schemeClr val="accent1"/>
-            </a:lnRef>
-            <a:fillRef idx="0">
-              <a:schemeClr val="accent1"/>
-            </a:fillRef>
-            <a:effectRef idx="0">
-              <a:schemeClr val="accent1"/>
-            </a:effectRef>
-            <a:fontRef idx="minor">
-              <a:schemeClr val="tx1"/>
-            </a:fontRef>
-          </p:style>
-        </p:cxnSp>
-      </p:grpSp>
+          <a:prstGeom prst="straightConnector1">
+            <a:avLst/>
+          </a:prstGeom>
+          <a:ln>
+            <a:tailEnd type="triangle"/>
+          </a:ln>
+        </p:spPr>
+        <p:style>
+          <a:lnRef idx="1">
+            <a:schemeClr val="accent1"/>
+          </a:lnRef>
+          <a:fillRef idx="0">
+            <a:schemeClr val="accent1"/>
+          </a:fillRef>
+          <a:effectRef idx="0">
+            <a:schemeClr val="accent1"/>
+          </a:effectRef>
+          <a:fontRef idx="minor">
+            <a:schemeClr val="tx1"/>
+          </a:fontRef>
+        </p:style>
+      </p:cxnSp>
       <p:sp>
         <p:nvSpPr>
           <p:cNvPr id="74" name="TextBox 73">
@@ -4362,8 +4346,8 @@
         </p:nvSpPr>
         <p:spPr>
           <a:xfrm>
-            <a:off x="2770792" y="4358657"/>
-            <a:ext cx="433254" cy="253916"/>
+            <a:off x="4437191" y="4465500"/>
+            <a:ext cx="499059" cy="253916"/>
           </a:xfrm>
           <a:prstGeom prst="rect">
             <a:avLst/>
@@ -4398,8 +4382,8 @@
         </p:nvSpPr>
         <p:spPr>
           <a:xfrm>
-            <a:off x="3655911" y="4345054"/>
-            <a:ext cx="433254" cy="253916"/>
+            <a:off x="5361231" y="4466859"/>
+            <a:ext cx="499059" cy="253916"/>
           </a:xfrm>
           <a:prstGeom prst="rect">
             <a:avLst/>
@@ -4434,8 +4418,8 @@
         </p:nvGrpSpPr>
         <p:grpSpPr>
           <a:xfrm>
-            <a:off x="4590360" y="4040390"/>
-            <a:ext cx="999310" cy="572183"/>
+            <a:off x="6157903" y="4040390"/>
+            <a:ext cx="1151091" cy="723030"/>
             <a:chOff x="4590360" y="4040390"/>
             <a:chExt cx="999310" cy="572183"/>
           </a:xfrm>
@@ -4587,8 +4571,8 @@
         </p:nvGrpSpPr>
         <p:grpSpPr>
           <a:xfrm>
-            <a:off x="9090390" y="3082188"/>
-            <a:ext cx="999310" cy="572183"/>
+            <a:off x="10241555" y="3082188"/>
+            <a:ext cx="1151091" cy="723030"/>
             <a:chOff x="9177366" y="3172097"/>
             <a:chExt cx="999310" cy="572183"/>
           </a:xfrm>
@@ -4749,8 +4733,8 @@
         </p:nvSpPr>
         <p:spPr>
           <a:xfrm>
-            <a:off x="5156416" y="1990793"/>
-            <a:ext cx="1468046" cy="271859"/>
+            <a:off x="7197489" y="1986907"/>
+            <a:ext cx="1691022" cy="343530"/>
           </a:xfrm>
           <a:prstGeom prst="roundRect">
             <a:avLst/>
@@ -4803,8 +4787,8 @@
         </p:nvSpPr>
         <p:spPr>
           <a:xfrm>
-            <a:off x="5156416" y="1988920"/>
-            <a:ext cx="1468046" cy="271859"/>
+            <a:off x="7197489" y="1986907"/>
+            <a:ext cx="1691022" cy="343530"/>
           </a:xfrm>
           <a:prstGeom prst="roundRect">
             <a:avLst/>
@@ -4855,8 +4839,8 @@
         </p:nvGrpSpPr>
         <p:grpSpPr>
           <a:xfrm>
-            <a:off x="5450221" y="3747802"/>
-            <a:ext cx="429008" cy="554927"/>
+            <a:off x="7017764" y="3747801"/>
+            <a:ext cx="721130" cy="701225"/>
             <a:chOff x="5450221" y="3747802"/>
             <a:chExt cx="429008" cy="554927"/>
           </a:xfrm>
@@ -4955,8 +4939,8 @@
         </p:nvSpPr>
         <p:spPr>
           <a:xfrm>
-            <a:off x="4549774" y="3943386"/>
-            <a:ext cx="880088" cy="707882"/>
+            <a:off x="6117317" y="3943386"/>
+            <a:ext cx="1013761" cy="894504"/>
           </a:xfrm>
           <a:prstGeom prst="mathMultiply">
             <a:avLst/>
@@ -5002,41 +4986,6 @@
           <a:p>
             <a:pPr algn="ctr"/>
             <a:endParaRPr lang="en-US"/>
-          </a:p>
-        </p:txBody>
-      </p:sp>
-      <p:sp>
-        <p:nvSpPr>
-          <p:cNvPr id="101" name="TextBox 100">
-            <a:extLst>
-              <a:ext uri="{FF2B5EF4-FFF2-40B4-BE49-F238E27FC236}">
-                <a16:creationId xmlns:a16="http://schemas.microsoft.com/office/drawing/2014/main" id="{701CC208-C97C-4707-8C04-274B366649C9}"/>
-              </a:ext>
-            </a:extLst>
-          </p:cNvPr>
-          <p:cNvSpPr txBox="1"/>
-          <p:nvPr/>
-        </p:nvSpPr>
-        <p:spPr>
-          <a:xfrm>
-            <a:off x="5384031" y="5843452"/>
-            <a:ext cx="2056973" cy="261610"/>
-          </a:xfrm>
-          <a:prstGeom prst="rect">
-            <a:avLst/>
-          </a:prstGeom>
-          <a:noFill/>
-        </p:spPr>
-        <p:txBody>
-          <a:bodyPr wrap="none" rtlCol="0">
-            <a:spAutoFit/>
-          </a:bodyPr>
-          <a:lstStyle/>
-          <a:p>
-            <a:r>
-              <a:rPr lang="en-US" sz="1100" dirty="0"/>
-              <a:t>Termination Grace Period: 30sec</a:t>
-            </a:r>
           </a:p>
         </p:txBody>
       </p:sp>
@@ -5115,7 +5064,7 @@
                                     <p:cond delay="0"/>
                                   </p:stCondLst>
                                   <p:childTnLst>
-                                    <p:animMotion origin="layout" path="M -0.29167 0.17801 L -0.18242 0.17801 C -0.1336 0.17801 -0.07383 0.13473 -0.07383 0.09861 L -0.07383 0.01736 " pathEditMode="relative" rAng="10800000" ptsTypes="AAAA">
+                                    <p:animMotion origin="layout" path="M -0.24922 0.21227 L -0.16602 0.21227 C -0.12891 0.21227 -0.08346 0.15533 -0.08346 0.10787 L -0.08346 0.0007 " pathEditMode="relative" rAng="10800000" ptsTypes="AAAA">
                                       <p:cBhvr>
                                         <p:cTn id="9" dur="5000" spd="-100000" fill="hold"/>
                                         <p:tgtEl>
@@ -5126,7 +5075,7 @@
                                           <p:attrName>ppt_y</p:attrName>
                                         </p:attrNameLst>
                                       </p:cBhvr>
-                                      <p:rCtr x="10898" y="-8032"/>
+                                      <p:rCtr x="8294" y="-10579"/>
                                     </p:animMotion>
                                   </p:childTnLst>
                                 </p:cTn>
@@ -5266,74 +5215,21 @@
                             </p:childTnLst>
                           </p:cTn>
                         </p:par>
-                      </p:childTnLst>
-                    </p:cTn>
-                  </p:par>
-                  <p:par>
-                    <p:cTn id="22" fill="hold">
-                      <p:stCondLst>
-                        <p:cond delay="indefinite"/>
-                      </p:stCondLst>
-                      <p:childTnLst>
                         <p:par>
-                          <p:cTn id="23" fill="hold">
+                          <p:cTn id="22" fill="hold">
                             <p:stCondLst>
-                              <p:cond delay="0"/>
+                              <p:cond delay="11000"/>
                             </p:stCondLst>
                             <p:childTnLst>
                               <p:par>
-                                <p:cTn id="24" presetID="10" presetClass="exit" presetSubtype="0" fill="hold" nodeType="clickEffect">
+                                <p:cTn id="23" presetID="10" presetClass="exit" presetSubtype="0" fill="hold" grpId="1" nodeType="afterEffect">
                                   <p:stCondLst>
                                     <p:cond delay="0"/>
                                   </p:stCondLst>
                                   <p:childTnLst>
                                     <p:animEffect transition="out" filter="fade">
                                       <p:cBhvr>
-                                        <p:cTn id="25" dur="500"/>
-                                        <p:tgtEl>
-                                          <p:spTgt spid="99"/>
-                                        </p:tgtEl>
-                                      </p:cBhvr>
-                                    </p:animEffect>
-                                    <p:set>
-                                      <p:cBhvr>
-                                        <p:cTn id="26" dur="1" fill="hold">
-                                          <p:stCondLst>
-                                            <p:cond delay="499"/>
-                                          </p:stCondLst>
-                                        </p:cTn>
-                                        <p:tgtEl>
-                                          <p:spTgt spid="99"/>
-                                        </p:tgtEl>
-                                        <p:attrNameLst>
-                                          <p:attrName>style.visibility</p:attrName>
-                                        </p:attrNameLst>
-                                      </p:cBhvr>
-                                      <p:to>
-                                        <p:strVal val="hidden"/>
-                                      </p:to>
-                                    </p:set>
-                                  </p:childTnLst>
-                                </p:cTn>
-                              </p:par>
-                            </p:childTnLst>
-                          </p:cTn>
-                        </p:par>
-                        <p:par>
-                          <p:cTn id="27" fill="hold">
-                            <p:stCondLst>
-                              <p:cond delay="500"/>
-                            </p:stCondLst>
-                            <p:childTnLst>
-                              <p:par>
-                                <p:cTn id="28" presetID="10" presetClass="exit" presetSubtype="0" fill="hold" grpId="1" nodeType="afterEffect">
-                                  <p:stCondLst>
-                                    <p:cond delay="0"/>
-                                  </p:stCondLst>
-                                  <p:childTnLst>
-                                    <p:animEffect transition="out" filter="fade">
-                                      <p:cBhvr>
-                                        <p:cTn id="29" dur="500"/>
+                                        <p:cTn id="24" dur="500"/>
                                         <p:tgtEl>
                                           <p:spTgt spid="83"/>
                                         </p:tgtEl>
@@ -5341,7 +5237,7 @@
                                     </p:animEffect>
                                     <p:set>
                                       <p:cBhvr>
-                                        <p:cTn id="30" dur="1" fill="hold">
+                                        <p:cTn id="25" dur="1" fill="hold">
                                           <p:stCondLst>
                                             <p:cond delay="499"/>
                                           </p:stCondLst>
@@ -5367,26 +5263,26 @@
                     </p:cTn>
                   </p:par>
                   <p:par>
-                    <p:cTn id="31" fill="hold">
+                    <p:cTn id="26" fill="hold">
                       <p:stCondLst>
                         <p:cond delay="indefinite"/>
                       </p:stCondLst>
                       <p:childTnLst>
                         <p:par>
-                          <p:cTn id="32" fill="hold">
+                          <p:cTn id="27" fill="hold">
                             <p:stCondLst>
                               <p:cond delay="0"/>
                             </p:stCondLst>
                             <p:childTnLst>
                               <p:par>
-                                <p:cTn id="33" presetID="42" presetClass="path" presetSubtype="0" accel="50000" decel="50000" fill="hold" grpId="1" nodeType="clickEffect">
+                                <p:cTn id="28" presetID="42" presetClass="path" presetSubtype="0" accel="50000" decel="50000" fill="hold" grpId="1" nodeType="clickEffect">
                                   <p:stCondLst>
                                     <p:cond delay="0"/>
                                   </p:stCondLst>
                                   <p:childTnLst>
-                                    <p:animMotion origin="layout" path="M 0 0 L 0 0.25 E" pathEditMode="relative" ptsTypes="">
+                                    <p:animMotion origin="layout" path="M 8.33333E-7 3.7037E-6 L 8.33333E-7 0.25 " pathEditMode="relative" rAng="0" ptsTypes="AA">
                                       <p:cBhvr>
-                                        <p:cTn id="34" dur="2000" fill="hold"/>
+                                        <p:cTn id="29" dur="2000" fill="hold"/>
                                         <p:tgtEl>
                                           <p:spTgt spid="98"/>
                                         </p:tgtEl>
@@ -5395,19 +5291,20 @@
                                           <p:attrName>ppt_y</p:attrName>
                                         </p:attrNameLst>
                                       </p:cBhvr>
+                                      <p:rCtr x="0" y="12500"/>
                                     </p:animMotion>
                                   </p:childTnLst>
                                 </p:cTn>
                               </p:par>
                               <p:par>
-                                <p:cTn id="35" presetID="42" presetClass="path" presetSubtype="0" accel="50000" decel="50000" fill="hold" nodeType="withEffect">
+                                <p:cTn id="30" presetID="42" presetClass="path" presetSubtype="0" accel="50000" decel="50000" fill="hold" nodeType="withEffect">
                                   <p:stCondLst>
                                     <p:cond delay="0"/>
                                   </p:stCondLst>
                                   <p:childTnLst>
-                                    <p:animMotion origin="layout" path="M 0 0 L 0 0.25 E" pathEditMode="relative" ptsTypes="">
+                                    <p:animMotion origin="layout" path="M -3.54167E-6 1.85185E-6 L -3.54167E-6 0.25 " pathEditMode="relative" rAng="0" ptsTypes="AA">
                                       <p:cBhvr>
-                                        <p:cTn id="36" dur="2000" fill="hold"/>
+                                        <p:cTn id="31" dur="2000" fill="hold"/>
                                         <p:tgtEl>
                                           <p:spTgt spid="100"/>
                                         </p:tgtEl>
@@ -5416,51 +5313,8 @@
                                           <p:attrName>ppt_y</p:attrName>
                                         </p:attrNameLst>
                                       </p:cBhvr>
+                                      <p:rCtr x="0" y="12500"/>
                                     </p:animMotion>
-                                  </p:childTnLst>
-                                </p:cTn>
-                              </p:par>
-                            </p:childTnLst>
-                          </p:cTn>
-                        </p:par>
-                        <p:par>
-                          <p:cTn id="37" fill="hold">
-                            <p:stCondLst>
-                              <p:cond delay="2000"/>
-                            </p:stCondLst>
-                            <p:childTnLst>
-                              <p:par>
-                                <p:cTn id="38" presetID="10" presetClass="entr" presetSubtype="0" fill="hold" grpId="0" nodeType="afterEffect">
-                                  <p:stCondLst>
-                                    <p:cond delay="0"/>
-                                  </p:stCondLst>
-                                  <p:childTnLst>
-                                    <p:set>
-                                      <p:cBhvr>
-                                        <p:cTn id="39" dur="1" fill="hold">
-                                          <p:stCondLst>
-                                            <p:cond delay="0"/>
-                                          </p:stCondLst>
-                                        </p:cTn>
-                                        <p:tgtEl>
-                                          <p:spTgt spid="101"/>
-                                        </p:tgtEl>
-                                        <p:attrNameLst>
-                                          <p:attrName>style.visibility</p:attrName>
-                                        </p:attrNameLst>
-                                      </p:cBhvr>
-                                      <p:to>
-                                        <p:strVal val="visible"/>
-                                      </p:to>
-                                    </p:set>
-                                    <p:animEffect transition="in" filter="fade">
-                                      <p:cBhvr>
-                                        <p:cTn id="40" dur="3000"/>
-                                        <p:tgtEl>
-                                          <p:spTgt spid="101"/>
-                                        </p:tgtEl>
-                                      </p:cBhvr>
-                                    </p:animEffect>
                                   </p:childTnLst>
                                 </p:cTn>
                               </p:par>
@@ -5496,7 +5350,6 @@
       <p:bldP spid="83" grpId="1" animBg="1"/>
       <p:bldP spid="98" grpId="0" animBg="1"/>
       <p:bldP spid="98" grpId="1" animBg="1"/>
-      <p:bldP spid="101" grpId="0"/>
     </p:bldLst>
   </p:timing>
 </p:sld>

</xml_diff>